<commit_message>
changed .apk to .Apk
git-svn-id: https://asi-storage07.blr.allegisindia.com/svn/EASi_App-POC@100 56ebe14e-9609-f449-8404-ff2adf786831
</commit_message>
<xml_diff>
--- a/trunk/Internal/EasiCab/Documents/EASiCab_POC_kick off.pptx
+++ b/trunk/Internal/EasiCab/Documents/EASiCab_POC_kick off.pptx
@@ -132,7 +132,7 @@
   </p:defaultTextStyle>
   <p:extLst>
     <p:ext uri="{EFAFB233-063F-42B5-8137-9DF3F51BA10A}">
-      <p15:sldGuideLst xmlns:p15="http://schemas.microsoft.com/office/powerpoint/2012/main" xmlns="">
+      <p15:sldGuideLst xmlns="" xmlns:p15="http://schemas.microsoft.com/office/powerpoint/2012/main">
         <p15:guide id="1" orient="horz" pos="2592" userDrawn="1">
           <p15:clr>
             <a:srgbClr val="A4A3A4"/>
@@ -241,7 +241,7 @@
           <a:p>
             <a:fld id="{10547AE1-0D1D-3A4D-8566-358FA96FF472}" type="datetimeFigureOut">
               <a:rPr lang="en-US" smtClean="0"/>
-              <a:t>8/26/2016</a:t>
+              <a:t>4/12/2017</a:t>
             </a:fld>
             <a:endParaRPr lang="en-US"/>
           </a:p>
@@ -407,7 +407,7 @@
           <a:p>
             <a:fld id="{555608FB-558C-E448-AAE5-74BFB92C58FE}" type="datetimeFigureOut">
               <a:rPr lang="en-US" smtClean="0"/>
-              <a:t>8/26/2016</a:t>
+              <a:t>4/12/2017</a:t>
             </a:fld>
             <a:endParaRPr lang="en-US"/>
           </a:p>
@@ -13005,18 +13005,32 @@
               <a:t>.</a:t>
             </a:r>
             <a:r>
+              <a:rPr lang="en-US" sz="1800" dirty="0" err="1">
+                <a:latin typeface="Calibri" panose="020F0502020204030204" pitchFamily="34" charset="0"/>
+                <a:cs typeface="Calibri" panose="020F0502020204030204" pitchFamily="34" charset="0"/>
+              </a:rPr>
+              <a:t>A</a:t>
+            </a:r>
+            <a:r>
               <a:rPr lang="en-US" sz="1800" dirty="0" err="1" smtClean="0">
                 <a:latin typeface="Calibri" panose="020F0502020204030204" pitchFamily="34" charset="0"/>
                 <a:cs typeface="Calibri" panose="020F0502020204030204" pitchFamily="34" charset="0"/>
               </a:rPr>
-              <a:t>apk</a:t>
+              <a:t>pk</a:t>
             </a:r>
             <a:r>
               <a:rPr lang="en-US" sz="1800" dirty="0" smtClean="0">
                 <a:latin typeface="Calibri" panose="020F0502020204030204" pitchFamily="34" charset="0"/>
                 <a:cs typeface="Calibri" panose="020F0502020204030204" pitchFamily="34" charset="0"/>
               </a:rPr>
-              <a:t> file of android </a:t>
+              <a:t> </a:t>
+            </a:r>
+            <a:r>
+              <a:rPr lang="en-US" sz="1800" dirty="0" smtClean="0">
+                <a:latin typeface="Calibri" panose="020F0502020204030204" pitchFamily="34" charset="0"/>
+                <a:cs typeface="Calibri" panose="020F0502020204030204" pitchFamily="34" charset="0"/>
+              </a:rPr>
+              <a:t>file of android </a:t>
             </a:r>
           </a:p>
           <a:p>
@@ -13994,21 +14008,7 @@
                 <a:latin typeface="Calibri" panose="020F0502020204030204" pitchFamily="34" charset="0"/>
                 <a:cs typeface="Calibri" panose="020F0502020204030204" pitchFamily="34" charset="0"/>
               </a:rPr>
-              <a:t>         </a:t>
-            </a:r>
-            <a:r>
-              <a:rPr lang="en-US" sz="1800" dirty="0" smtClean="0">
-                <a:latin typeface="Calibri" panose="020F0502020204030204" pitchFamily="34" charset="0"/>
-                <a:cs typeface="Calibri" panose="020F0502020204030204" pitchFamily="34" charset="0"/>
-              </a:rPr>
-              <a:t>Allegis Engineering </a:t>
-            </a:r>
-            <a:r>
-              <a:rPr lang="en-US" sz="1800" dirty="0" smtClean="0">
-                <a:latin typeface="Calibri" panose="020F0502020204030204" pitchFamily="34" charset="0"/>
-                <a:cs typeface="Calibri" panose="020F0502020204030204" pitchFamily="34" charset="0"/>
-              </a:rPr>
-              <a:t>Travel Desk</a:t>
+              <a:t>         Allegis Engineering Travel Desk</a:t>
             </a:r>
             <a:endParaRPr lang="en-US" sz="1800" dirty="0">
               <a:latin typeface="Calibri" panose="020F0502020204030204" pitchFamily="34" charset="0"/>
@@ -14073,14 +14073,7 @@
                 <a:latin typeface="Calibri" panose="020F0502020204030204" pitchFamily="34" charset="0"/>
                 <a:cs typeface="Calibri" panose="020F0502020204030204" pitchFamily="34" charset="0"/>
               </a:rPr>
-              <a:t>Allegis Engineering </a:t>
-            </a:r>
-            <a:r>
-              <a:rPr lang="en-US" sz="1800" dirty="0">
-                <a:latin typeface="Calibri" panose="020F0502020204030204" pitchFamily="34" charset="0"/>
-                <a:cs typeface="Calibri" panose="020F0502020204030204" pitchFamily="34" charset="0"/>
-              </a:rPr>
-              <a:t>Travel </a:t>
+              <a:t>Allegis Engineering Travel </a:t>
             </a:r>
             <a:r>
               <a:rPr lang="en-US" sz="1800" dirty="0" smtClean="0">

</xml_diff>